<commit_message>
Se modifico Clases User-Rol-Mensaje
</commit_message>
<xml_diff>
--- a/Proyecto Final.pptx
+++ b/Proyecto Final.pptx
@@ -110,6 +110,11 @@
       </a:defRPr>
     </a:lvl9pPr>
   </p:defaultTextStyle>
+  <p:extLst>
+    <p:ext uri="{EFAFB233-063F-42B5-8137-9DF3F51BA10A}">
+      <p15:sldGuideLst xmlns:p15="http://schemas.microsoft.com/office/powerpoint/2012/main"/>
+    </p:ext>
+  </p:extLst>
 </p:presentation>
 </file>
 
@@ -195,7 +200,7 @@
           <a:p>
             <a:fld id="{C906ED8E-0C8E-AA4D-8B6F-7D20A79DF0FE}" type="datetimeFigureOut">
               <a:rPr lang="es-BO" smtClean="0"/>
-              <a:t>23/9/22</a:t>
+              <a:t>24/9/22</a:t>
             </a:fld>
             <a:endParaRPr lang="es-BO"/>
           </a:p>
@@ -671,7 +676,7 @@
           <a:p>
             <a:fld id="{F3F79338-E29E-DD43-A22F-B769B41EBA49}" type="datetimeFigureOut">
               <a:rPr lang="es-BO" smtClean="0"/>
-              <a:t>23/9/22</a:t>
+              <a:t>24/9/22</a:t>
             </a:fld>
             <a:endParaRPr lang="es-BO"/>
           </a:p>
@@ -846,7 +851,7 @@
           <a:p>
             <a:fld id="{F3F79338-E29E-DD43-A22F-B769B41EBA49}" type="datetimeFigureOut">
               <a:rPr lang="es-BO" smtClean="0"/>
-              <a:t>23/9/22</a:t>
+              <a:t>24/9/22</a:t>
             </a:fld>
             <a:endParaRPr lang="es-BO"/>
           </a:p>
@@ -1031,7 +1036,7 @@
           <a:p>
             <a:fld id="{F3F79338-E29E-DD43-A22F-B769B41EBA49}" type="datetimeFigureOut">
               <a:rPr lang="es-BO" smtClean="0"/>
-              <a:t>23/9/22</a:t>
+              <a:t>24/9/22</a:t>
             </a:fld>
             <a:endParaRPr lang="es-BO"/>
           </a:p>
@@ -1206,7 +1211,7 @@
           <a:p>
             <a:fld id="{F3F79338-E29E-DD43-A22F-B769B41EBA49}" type="datetimeFigureOut">
               <a:rPr lang="es-BO" smtClean="0"/>
-              <a:t>23/9/22</a:t>
+              <a:t>24/9/22</a:t>
             </a:fld>
             <a:endParaRPr lang="es-BO"/>
           </a:p>
@@ -1486,7 +1491,7 @@
           <a:p>
             <a:fld id="{F3F79338-E29E-DD43-A22F-B769B41EBA49}" type="datetimeFigureOut">
               <a:rPr lang="es-BO" smtClean="0"/>
-              <a:t>23/9/22</a:t>
+              <a:t>24/9/22</a:t>
             </a:fld>
             <a:endParaRPr lang="es-BO"/>
           </a:p>
@@ -1704,7 +1709,7 @@
           <a:p>
             <a:fld id="{F3F79338-E29E-DD43-A22F-B769B41EBA49}" type="datetimeFigureOut">
               <a:rPr lang="es-BO" smtClean="0"/>
-              <a:t>23/9/22</a:t>
+              <a:t>24/9/22</a:t>
             </a:fld>
             <a:endParaRPr lang="es-BO"/>
           </a:p>
@@ -2077,7 +2082,7 @@
           <a:p>
             <a:fld id="{F3F79338-E29E-DD43-A22F-B769B41EBA49}" type="datetimeFigureOut">
               <a:rPr lang="es-BO" smtClean="0"/>
-              <a:t>23/9/22</a:t>
+              <a:t>24/9/22</a:t>
             </a:fld>
             <a:endParaRPr lang="es-BO"/>
           </a:p>
@@ -2219,7 +2224,7 @@
           <a:p>
             <a:fld id="{F3F79338-E29E-DD43-A22F-B769B41EBA49}" type="datetimeFigureOut">
               <a:rPr lang="es-BO" smtClean="0"/>
-              <a:t>23/9/22</a:t>
+              <a:t>24/9/22</a:t>
             </a:fld>
             <a:endParaRPr lang="es-BO"/>
           </a:p>
@@ -2332,7 +2337,7 @@
           <a:p>
             <a:fld id="{F3F79338-E29E-DD43-A22F-B769B41EBA49}" type="datetimeFigureOut">
               <a:rPr lang="es-BO" smtClean="0"/>
-              <a:t>23/9/22</a:t>
+              <a:t>24/9/22</a:t>
             </a:fld>
             <a:endParaRPr lang="es-BO"/>
           </a:p>
@@ -2624,7 +2629,7 @@
           <a:p>
             <a:fld id="{F3F79338-E29E-DD43-A22F-B769B41EBA49}" type="datetimeFigureOut">
               <a:rPr lang="es-BO" smtClean="0"/>
-              <a:t>23/9/22</a:t>
+              <a:t>24/9/22</a:t>
             </a:fld>
             <a:endParaRPr lang="es-BO"/>
           </a:p>
@@ -2917,7 +2922,7 @@
           <a:p>
             <a:fld id="{F3F79338-E29E-DD43-A22F-B769B41EBA49}" type="datetimeFigureOut">
               <a:rPr lang="es-BO" smtClean="0"/>
-              <a:t>23/9/22</a:t>
+              <a:t>24/9/22</a:t>
             </a:fld>
             <a:endParaRPr lang="es-BO"/>
           </a:p>
@@ -3135,7 +3140,7 @@
           <a:p>
             <a:fld id="{F3F79338-E29E-DD43-A22F-B769B41EBA49}" type="datetimeFigureOut">
               <a:rPr lang="es-BO" smtClean="0"/>
-              <a:t>23/9/22</a:t>
+              <a:t>24/9/22</a:t>
             </a:fld>
             <a:endParaRPr lang="es-BO"/>
           </a:p>
@@ -4535,7 +4540,7 @@
         <p:spPr>
           <a:xfrm>
             <a:off x="742239" y="2090852"/>
-            <a:ext cx="1486824" cy="1404907"/>
+            <a:ext cx="1486824" cy="1670596"/>
           </a:xfrm>
           <a:prstGeom prst="rect">
             <a:avLst/>
@@ -4577,6 +4582,13 @@
             </a:br>
             <a:r>
               <a:rPr lang="es-BO" sz="1200" dirty="0"/>
+              <a:t>email</a:t>
+            </a:r>
+            <a:br>
+              <a:rPr lang="es-BO" sz="1200" dirty="0"/>
+            </a:br>
+            <a:r>
+              <a:rPr lang="es-BO" sz="1200" dirty="0"/>
               <a:t>Nombre</a:t>
             </a:r>
             <a:br>
@@ -4584,7 +4596,7 @@
             </a:br>
             <a:r>
               <a:rPr lang="es-BO" sz="1200" dirty="0"/>
-              <a:t>…..</a:t>
+              <a:t>Edad</a:t>
             </a:r>
             <a:br>
               <a:rPr lang="es-BO" sz="1200" dirty="0"/>
@@ -4592,6 +4604,20 @@
             <a:r>
               <a:rPr lang="es-BO" sz="1200" dirty="0"/>
               <a:t>Estado (Act/Imnac)</a:t>
+            </a:r>
+            <a:br>
+              <a:rPr lang="es-BO" sz="1200" dirty="0"/>
+            </a:br>
+            <a:r>
+              <a:rPr lang="es-BO" sz="1200" dirty="0"/>
+              <a:t>Contraseña</a:t>
+            </a:r>
+            <a:br>
+              <a:rPr lang="es-BO" sz="1200" dirty="0"/>
+            </a:br>
+            <a:r>
+              <a:rPr lang="es-BO" sz="1200" dirty="0"/>
+              <a:t>EstaACtivo</a:t>
             </a:r>
           </a:p>
         </p:txBody>
@@ -4656,6 +4682,9 @@
               <a:t>Nombre</a:t>
             </a:r>
           </a:p>
+          <a:p>
+            <a:endParaRPr lang="es-BO" dirty="0"/>
+          </a:p>
         </p:txBody>
       </p:sp>
       <p:sp>
@@ -4672,8 +4701,8 @@
         </p:nvSpPr>
         <p:spPr>
           <a:xfrm>
-            <a:off x="4863548" y="1065265"/>
-            <a:ext cx="1465771" cy="1558665"/>
+            <a:off x="1324955" y="3996116"/>
+            <a:ext cx="1465771" cy="2379796"/>
           </a:xfrm>
           <a:prstGeom prst="rect">
             <a:avLst/>
@@ -4703,6 +4732,34 @@
             <a:r>
               <a:rPr lang="es-BO" dirty="0"/>
               <a:t>Mensajes</a:t>
+            </a:r>
+            <a:br>
+              <a:rPr lang="es-BO" dirty="0"/>
+            </a:br>
+            <a:r>
+              <a:rPr lang="es-BO" dirty="0"/>
+              <a:t>idMensaje</a:t>
+            </a:r>
+            <a:br>
+              <a:rPr lang="es-BO" dirty="0"/>
+            </a:br>
+            <a:r>
+              <a:rPr lang="es-BO" dirty="0"/>
+              <a:t>Mensaje</a:t>
+            </a:r>
+            <a:br>
+              <a:rPr lang="es-BO" dirty="0"/>
+            </a:br>
+            <a:r>
+              <a:rPr lang="es-BO" dirty="0"/>
+              <a:t>IdUsuario</a:t>
+            </a:r>
+            <a:br>
+              <a:rPr lang="es-BO" dirty="0"/>
+            </a:br>
+            <a:r>
+              <a:rPr lang="es-BO" dirty="0"/>
+              <a:t>EstaActivo</a:t>
             </a:r>
           </a:p>
         </p:txBody>
@@ -4863,6 +4920,69 @@
           </a:fontRef>
         </p:style>
       </p:cxnSp>
+      <p:sp>
+        <p:nvSpPr>
+          <p:cNvPr id="3" name="Rectángulo 2">
+            <a:extLst>
+              <a:ext uri="{FF2B5EF4-FFF2-40B4-BE49-F238E27FC236}">
+                <a16:creationId xmlns:a16="http://schemas.microsoft.com/office/drawing/2014/main" id="{1A5FB614-A92C-DE46-A367-B7D5E080C23F}"/>
+              </a:ext>
+            </a:extLst>
+          </p:cNvPr>
+          <p:cNvSpPr/>
+          <p:nvPr/>
+        </p:nvSpPr>
+        <p:spPr>
+          <a:xfrm>
+            <a:off x="7397468" y="4850296"/>
+            <a:ext cx="2009579" cy="1725868"/>
+          </a:xfrm>
+          <a:prstGeom prst="rect">
+            <a:avLst/>
+          </a:prstGeom>
+        </p:spPr>
+        <p:style>
+          <a:lnRef idx="2">
+            <a:schemeClr val="accent1">
+              <a:shade val="50000"/>
+            </a:schemeClr>
+          </a:lnRef>
+          <a:fillRef idx="1">
+            <a:schemeClr val="accent1"/>
+          </a:fillRef>
+          <a:effectRef idx="0">
+            <a:schemeClr val="accent1"/>
+          </a:effectRef>
+          <a:fontRef idx="minor">
+            <a:schemeClr val="lt1"/>
+          </a:fontRef>
+        </p:style>
+        <p:txBody>
+          <a:bodyPr rtlCol="0" anchor="ctr"/>
+          <a:lstStyle/>
+          <a:p>
+            <a:pPr algn="ctr"/>
+            <a:r>
+              <a:rPr lang="es-BO" dirty="0"/>
+              <a:t>UsuarioRol</a:t>
+            </a:r>
+            <a:br>
+              <a:rPr lang="es-BO" dirty="0"/>
+            </a:br>
+            <a:r>
+              <a:rPr lang="es-BO" dirty="0"/>
+              <a:t>IdUsuario</a:t>
+            </a:r>
+            <a:br>
+              <a:rPr lang="es-BO" dirty="0"/>
+            </a:br>
+            <a:r>
+              <a:rPr lang="es-BO" dirty="0"/>
+              <a:t>IdRol</a:t>
+            </a:r>
+          </a:p>
+        </p:txBody>
+      </p:sp>
     </p:spTree>
     <p:extLst>
       <p:ext uri="{BB962C8B-B14F-4D97-AF65-F5344CB8AC3E}">

</xml_diff>

<commit_message>
Lista de proyectos finales
</commit_message>
<xml_diff>
--- a/Proyecto Final.pptx
+++ b/Proyecto Final.pptx
@@ -110,6 +110,11 @@
       </a:defRPr>
     </a:lvl9pPr>
   </p:defaultTextStyle>
+  <p:extLst>
+    <p:ext uri="{EFAFB233-063F-42B5-8137-9DF3F51BA10A}">
+      <p15:sldGuideLst xmlns:p15="http://schemas.microsoft.com/office/powerpoint/2012/main"/>
+    </p:ext>
+  </p:extLst>
 </p:presentation>
 </file>
 
@@ -195,7 +200,7 @@
           <a:p>
             <a:fld id="{C906ED8E-0C8E-AA4D-8B6F-7D20A79DF0FE}" type="datetimeFigureOut">
               <a:rPr lang="es-BO" smtClean="0"/>
-              <a:t>23/9/22</a:t>
+              <a:t>24/9/22</a:t>
             </a:fld>
             <a:endParaRPr lang="es-BO"/>
           </a:p>
@@ -671,7 +676,7 @@
           <a:p>
             <a:fld id="{F3F79338-E29E-DD43-A22F-B769B41EBA49}" type="datetimeFigureOut">
               <a:rPr lang="es-BO" smtClean="0"/>
-              <a:t>23/9/22</a:t>
+              <a:t>24/9/22</a:t>
             </a:fld>
             <a:endParaRPr lang="es-BO"/>
           </a:p>
@@ -846,7 +851,7 @@
           <a:p>
             <a:fld id="{F3F79338-E29E-DD43-A22F-B769B41EBA49}" type="datetimeFigureOut">
               <a:rPr lang="es-BO" smtClean="0"/>
-              <a:t>23/9/22</a:t>
+              <a:t>24/9/22</a:t>
             </a:fld>
             <a:endParaRPr lang="es-BO"/>
           </a:p>
@@ -1031,7 +1036,7 @@
           <a:p>
             <a:fld id="{F3F79338-E29E-DD43-A22F-B769B41EBA49}" type="datetimeFigureOut">
               <a:rPr lang="es-BO" smtClean="0"/>
-              <a:t>23/9/22</a:t>
+              <a:t>24/9/22</a:t>
             </a:fld>
             <a:endParaRPr lang="es-BO"/>
           </a:p>
@@ -1206,7 +1211,7 @@
           <a:p>
             <a:fld id="{F3F79338-E29E-DD43-A22F-B769B41EBA49}" type="datetimeFigureOut">
               <a:rPr lang="es-BO" smtClean="0"/>
-              <a:t>23/9/22</a:t>
+              <a:t>24/9/22</a:t>
             </a:fld>
             <a:endParaRPr lang="es-BO"/>
           </a:p>
@@ -1486,7 +1491,7 @@
           <a:p>
             <a:fld id="{F3F79338-E29E-DD43-A22F-B769B41EBA49}" type="datetimeFigureOut">
               <a:rPr lang="es-BO" smtClean="0"/>
-              <a:t>23/9/22</a:t>
+              <a:t>24/9/22</a:t>
             </a:fld>
             <a:endParaRPr lang="es-BO"/>
           </a:p>
@@ -1704,7 +1709,7 @@
           <a:p>
             <a:fld id="{F3F79338-E29E-DD43-A22F-B769B41EBA49}" type="datetimeFigureOut">
               <a:rPr lang="es-BO" smtClean="0"/>
-              <a:t>23/9/22</a:t>
+              <a:t>24/9/22</a:t>
             </a:fld>
             <a:endParaRPr lang="es-BO"/>
           </a:p>
@@ -2077,7 +2082,7 @@
           <a:p>
             <a:fld id="{F3F79338-E29E-DD43-A22F-B769B41EBA49}" type="datetimeFigureOut">
               <a:rPr lang="es-BO" smtClean="0"/>
-              <a:t>23/9/22</a:t>
+              <a:t>24/9/22</a:t>
             </a:fld>
             <a:endParaRPr lang="es-BO"/>
           </a:p>
@@ -2219,7 +2224,7 @@
           <a:p>
             <a:fld id="{F3F79338-E29E-DD43-A22F-B769B41EBA49}" type="datetimeFigureOut">
               <a:rPr lang="es-BO" smtClean="0"/>
-              <a:t>23/9/22</a:t>
+              <a:t>24/9/22</a:t>
             </a:fld>
             <a:endParaRPr lang="es-BO"/>
           </a:p>
@@ -2332,7 +2337,7 @@
           <a:p>
             <a:fld id="{F3F79338-E29E-DD43-A22F-B769B41EBA49}" type="datetimeFigureOut">
               <a:rPr lang="es-BO" smtClean="0"/>
-              <a:t>23/9/22</a:t>
+              <a:t>24/9/22</a:t>
             </a:fld>
             <a:endParaRPr lang="es-BO"/>
           </a:p>
@@ -2624,7 +2629,7 @@
           <a:p>
             <a:fld id="{F3F79338-E29E-DD43-A22F-B769B41EBA49}" type="datetimeFigureOut">
               <a:rPr lang="es-BO" smtClean="0"/>
-              <a:t>23/9/22</a:t>
+              <a:t>24/9/22</a:t>
             </a:fld>
             <a:endParaRPr lang="es-BO"/>
           </a:p>
@@ -2917,7 +2922,7 @@
           <a:p>
             <a:fld id="{F3F79338-E29E-DD43-A22F-B769B41EBA49}" type="datetimeFigureOut">
               <a:rPr lang="es-BO" smtClean="0"/>
-              <a:t>23/9/22</a:t>
+              <a:t>24/9/22</a:t>
             </a:fld>
             <a:endParaRPr lang="es-BO"/>
           </a:p>
@@ -3135,7 +3140,7 @@
           <a:p>
             <a:fld id="{F3F79338-E29E-DD43-A22F-B769B41EBA49}" type="datetimeFigureOut">
               <a:rPr lang="es-BO" smtClean="0"/>
-              <a:t>23/9/22</a:t>
+              <a:t>24/9/22</a:t>
             </a:fld>
             <a:endParaRPr lang="es-BO"/>
           </a:p>
@@ -3695,7 +3700,15 @@
           <a:p>
             <a:r>
               <a:rPr lang="es-BO" dirty="0"/>
-              <a:t>Cada uno puede administrar sus mensajes pero solo los que tengan el rol de administracionpodran eliminar usuarios y mensajes.</a:t>
+              <a:t>Cada uno puede administrar sus mensajes pero solo los que tengan el rol </a:t>
+            </a:r>
+            <a:r>
+              <a:rPr lang="es-BO"/>
+              <a:t>de administracion podran </a:t>
+            </a:r>
+            <a:r>
+              <a:rPr lang="es-BO" dirty="0"/>
+              <a:t>eliminar usuarios y mensajes.</a:t>
             </a:r>
           </a:p>
           <a:p>
@@ -4535,7 +4548,7 @@
         <p:spPr>
           <a:xfrm>
             <a:off x="742239" y="2090852"/>
-            <a:ext cx="1486824" cy="1404907"/>
+            <a:ext cx="1486824" cy="1670596"/>
           </a:xfrm>
           <a:prstGeom prst="rect">
             <a:avLst/>
@@ -4577,21 +4590,42 @@
             </a:br>
             <a:r>
               <a:rPr lang="es-BO" sz="1200" dirty="0"/>
-              <a:t>Nombre</a:t>
+              <a:t>email</a:t>
             </a:r>
             <a:br>
               <a:rPr lang="es-BO" sz="1200" dirty="0"/>
             </a:br>
             <a:r>
               <a:rPr lang="es-BO" sz="1200" dirty="0"/>
-              <a:t>…..</a:t>
+              <a:t>Nombre</a:t>
             </a:r>
             <a:br>
               <a:rPr lang="es-BO" sz="1200" dirty="0"/>
             </a:br>
             <a:r>
               <a:rPr lang="es-BO" sz="1200" dirty="0"/>
+              <a:t>Edad</a:t>
+            </a:r>
+            <a:br>
+              <a:rPr lang="es-BO" sz="1200" dirty="0"/>
+            </a:br>
+            <a:r>
+              <a:rPr lang="es-BO" sz="1200" dirty="0"/>
               <a:t>Estado (Act/Imnac)</a:t>
+            </a:r>
+            <a:br>
+              <a:rPr lang="es-BO" sz="1200" dirty="0"/>
+            </a:br>
+            <a:r>
+              <a:rPr lang="es-BO" sz="1200" dirty="0"/>
+              <a:t>Contraseña</a:t>
+            </a:r>
+            <a:br>
+              <a:rPr lang="es-BO" sz="1200" dirty="0"/>
+            </a:br>
+            <a:r>
+              <a:rPr lang="es-BO" sz="1200" dirty="0"/>
+              <a:t>EstaACtivo</a:t>
             </a:r>
           </a:p>
         </p:txBody>
@@ -4656,6 +4690,9 @@
               <a:t>Nombre</a:t>
             </a:r>
           </a:p>
+          <a:p>
+            <a:endParaRPr lang="es-BO" dirty="0"/>
+          </a:p>
         </p:txBody>
       </p:sp>
       <p:sp>
@@ -4672,8 +4709,8 @@
         </p:nvSpPr>
         <p:spPr>
           <a:xfrm>
-            <a:off x="4863548" y="1065265"/>
-            <a:ext cx="1465771" cy="1558665"/>
+            <a:off x="1324955" y="3996116"/>
+            <a:ext cx="1465771" cy="2379796"/>
           </a:xfrm>
           <a:prstGeom prst="rect">
             <a:avLst/>
@@ -4703,6 +4740,34 @@
             <a:r>
               <a:rPr lang="es-BO" dirty="0"/>
               <a:t>Mensajes</a:t>
+            </a:r>
+            <a:br>
+              <a:rPr lang="es-BO" dirty="0"/>
+            </a:br>
+            <a:r>
+              <a:rPr lang="es-BO" dirty="0"/>
+              <a:t>idMensaje</a:t>
+            </a:r>
+            <a:br>
+              <a:rPr lang="es-BO" dirty="0"/>
+            </a:br>
+            <a:r>
+              <a:rPr lang="es-BO" dirty="0"/>
+              <a:t>Mensaje</a:t>
+            </a:r>
+            <a:br>
+              <a:rPr lang="es-BO" dirty="0"/>
+            </a:br>
+            <a:r>
+              <a:rPr lang="es-BO" dirty="0"/>
+              <a:t>IdUsuario</a:t>
+            </a:r>
+            <a:br>
+              <a:rPr lang="es-BO" dirty="0"/>
+            </a:br>
+            <a:r>
+              <a:rPr lang="es-BO" dirty="0"/>
+              <a:t>EstaActivo</a:t>
             </a:r>
           </a:p>
         </p:txBody>
@@ -4863,6 +4928,69 @@
           </a:fontRef>
         </p:style>
       </p:cxnSp>
+      <p:sp>
+        <p:nvSpPr>
+          <p:cNvPr id="3" name="Rectángulo 2">
+            <a:extLst>
+              <a:ext uri="{FF2B5EF4-FFF2-40B4-BE49-F238E27FC236}">
+                <a16:creationId xmlns:a16="http://schemas.microsoft.com/office/drawing/2014/main" id="{1A5FB614-A92C-DE46-A367-B7D5E080C23F}"/>
+              </a:ext>
+            </a:extLst>
+          </p:cNvPr>
+          <p:cNvSpPr/>
+          <p:nvPr/>
+        </p:nvSpPr>
+        <p:spPr>
+          <a:xfrm>
+            <a:off x="7397468" y="4850296"/>
+            <a:ext cx="2009579" cy="1725868"/>
+          </a:xfrm>
+          <a:prstGeom prst="rect">
+            <a:avLst/>
+          </a:prstGeom>
+        </p:spPr>
+        <p:style>
+          <a:lnRef idx="2">
+            <a:schemeClr val="accent1">
+              <a:shade val="50000"/>
+            </a:schemeClr>
+          </a:lnRef>
+          <a:fillRef idx="1">
+            <a:schemeClr val="accent1"/>
+          </a:fillRef>
+          <a:effectRef idx="0">
+            <a:schemeClr val="accent1"/>
+          </a:effectRef>
+          <a:fontRef idx="minor">
+            <a:schemeClr val="lt1"/>
+          </a:fontRef>
+        </p:style>
+        <p:txBody>
+          <a:bodyPr rtlCol="0" anchor="ctr"/>
+          <a:lstStyle/>
+          <a:p>
+            <a:pPr algn="ctr"/>
+            <a:r>
+              <a:rPr lang="es-BO" dirty="0"/>
+              <a:t>UsuarioRol</a:t>
+            </a:r>
+            <a:br>
+              <a:rPr lang="es-BO" dirty="0"/>
+            </a:br>
+            <a:r>
+              <a:rPr lang="es-BO" dirty="0"/>
+              <a:t>IdUsuario</a:t>
+            </a:r>
+            <a:br>
+              <a:rPr lang="es-BO" dirty="0"/>
+            </a:br>
+            <a:r>
+              <a:rPr lang="es-BO" dirty="0"/>
+              <a:t>IdRol</a:t>
+            </a:r>
+          </a:p>
+        </p:txBody>
+      </p:sp>
     </p:spTree>
     <p:extLst>
       <p:ext uri="{BB962C8B-B14F-4D97-AF65-F5344CB8AC3E}">

</xml_diff>